<commit_message>
JavaScript OOP - homework - 06. JavaScript Patterns and Modules
</commit_message>
<xml_diff>
--- a/9. JavaScript ООП/08. Creating and Using Exceptions/Creating-and-Using-Exceptions.pptx
+++ b/9. JavaScript ООП/08. Creating and Using Exceptions/Creating-and-Using-Exceptions.pptx
@@ -230,7 +230,7 @@
           <a:p>
             <a:fld id="{A0BBDC7E-E112-453F-BB1D-08FC47769104}" type="datetimeFigureOut">
               <a:rPr lang="en-US" smtClean="0"/>
-              <a:t>31-Jan-14</a:t>
+              <a:t>03-Jul-14</a:t>
             </a:fld>
             <a:endParaRPr lang="en-US"/>
           </a:p>
@@ -4910,7 +4910,7 @@
           <a:noFill/>
           <a:extLst>
             <a:ext uri="{909E8E84-426E-40dd-AFC4-6F175D3DCCD1}">
-              <a14:hiddenFill xmlns:a14="http://schemas.microsoft.com/office/drawing/2010/main" xmlns="">
+              <a14:hiddenFill xmlns="" xmlns:a14="http://schemas.microsoft.com/office/drawing/2010/main">
                 <a:solidFill>
                   <a:srgbClr val="FFFFFF"/>
                 </a:solidFill>
@@ -4955,14 +4955,14 @@
           <a:effectLst/>
           <a:extLst>
             <a:ext uri="{909E8E84-426E-40dd-AFC4-6F175D3DCCD1}">
-              <a14:hiddenFill xmlns:a14="http://schemas.microsoft.com/office/drawing/2010/main" xmlns="">
+              <a14:hiddenFill xmlns="" xmlns:a14="http://schemas.microsoft.com/office/drawing/2010/main">
                 <a:solidFill>
                   <a:schemeClr val="accent1"/>
                 </a:solidFill>
               </a14:hiddenFill>
             </a:ext>
             <a:ext uri="{91240B29-F687-4f45-9708-019B960494DF}">
-              <a14:hiddenLine xmlns:a14="http://schemas.microsoft.com/office/drawing/2010/main" xmlns="" w="9525">
+              <a14:hiddenLine xmlns="" xmlns:a14="http://schemas.microsoft.com/office/drawing/2010/main" w="9525">
                 <a:solidFill>
                   <a:schemeClr val="tx1"/>
                 </a:solidFill>
@@ -4972,7 +4972,7 @@
               </a14:hiddenLine>
             </a:ext>
             <a:ext uri="{AF507438-7753-43e0-B8FC-AC1667EBCBE1}">
-              <a14:hiddenEffects xmlns:a14="http://schemas.microsoft.com/office/drawing/2010/main" xmlns="">
+              <a14:hiddenEffects xmlns="" xmlns:a14="http://schemas.microsoft.com/office/drawing/2010/main">
                 <a:effectLst>
                   <a:outerShdw dist="35921" dir="2700000" algn="ctr" rotWithShape="0">
                     <a:schemeClr val="bg2"/>
@@ -5019,14 +5019,14 @@
           <a:effectLst/>
           <a:extLst>
             <a:ext uri="{909E8E84-426E-40dd-AFC4-6F175D3DCCD1}">
-              <a14:hiddenFill xmlns:a14="http://schemas.microsoft.com/office/drawing/2010/main" xmlns="">
+              <a14:hiddenFill xmlns="" xmlns:a14="http://schemas.microsoft.com/office/drawing/2010/main">
                 <a:solidFill>
                   <a:schemeClr val="accent1"/>
                 </a:solidFill>
               </a14:hiddenFill>
             </a:ext>
             <a:ext uri="{91240B29-F687-4f45-9708-019B960494DF}">
-              <a14:hiddenLine xmlns:a14="http://schemas.microsoft.com/office/drawing/2010/main" xmlns="" w="9525">
+              <a14:hiddenLine xmlns="" xmlns:a14="http://schemas.microsoft.com/office/drawing/2010/main" w="9525">
                 <a:solidFill>
                   <a:schemeClr val="tx1"/>
                 </a:solidFill>
@@ -5036,7 +5036,7 @@
               </a14:hiddenLine>
             </a:ext>
             <a:ext uri="{AF507438-7753-43e0-B8FC-AC1667EBCBE1}">
-              <a14:hiddenEffects xmlns:a14="http://schemas.microsoft.com/office/drawing/2010/main" xmlns="">
+              <a14:hiddenEffects xmlns="" xmlns:a14="http://schemas.microsoft.com/office/drawing/2010/main">
                 <a:effectLst>
                   <a:outerShdw dist="35921" dir="2700000" algn="ctr" rotWithShape="0">
                     <a:schemeClr val="bg2"/>
@@ -5096,7 +5096,7 @@
           </a:effectLst>
           <a:extLst>
             <a:ext uri="{909E8E84-426E-40dd-AFC4-6F175D3DCCD1}">
-              <a14:hiddenFill xmlns:a14="http://schemas.microsoft.com/office/drawing/2010/main" xmlns="">
+              <a14:hiddenFill xmlns="" xmlns:a14="http://schemas.microsoft.com/office/drawing/2010/main">
                 <a:solidFill>
                   <a:srgbClr val="FFFFFF"/>
                 </a:solidFill>
@@ -6843,7 +6843,7 @@
         <p:spPr>
           <a:xfrm>
             <a:off x="228600" y="712179"/>
-            <a:ext cx="8686800" cy="5791200"/>
+            <a:ext cx="8686800" cy="3582730"/>
           </a:xfrm>
         </p:spPr>
         <p:txBody>
@@ -6939,10 +6939,12 @@
             <a:pPr lvl="1"/>
             <a:r>
               <a:rPr lang="en-US" dirty="0" smtClean="0"/>
-              <a:t>Check the type of the exception object</a:t>
-            </a:r>
-          </a:p>
-          <a:p>
+              <a:t>Check the type of the exception </a:t>
+            </a:r>
+            <a:r>
+              <a:rPr lang="en-US" dirty="0" smtClean="0"/>
+              <a:t>object</a:t>
+            </a:r>
             <a:endParaRPr lang="en-US" dirty="0"/>
           </a:p>
         </p:txBody>
@@ -9197,8 +9199,8 @@
         </p:nvSpPr>
         <p:spPr>
           <a:xfrm>
-            <a:off x="228600" y="1246910"/>
-            <a:ext cx="8686800" cy="4405745"/>
+            <a:off x="822036" y="1246910"/>
+            <a:ext cx="8093364" cy="4405745"/>
           </a:xfrm>
         </p:spPr>
         <p:txBody>
@@ -9339,8 +9341,16 @@
                   </a:schemeClr>
                 </a:solidFill>
               </a:rPr>
-              <a:t>slowed</a:t>
-            </a:r>
+              <a:t>slower</a:t>
+            </a:r>
+            <a:endParaRPr lang="en-US" dirty="0" smtClean="0">
+              <a:solidFill>
+                <a:schemeClr val="accent5">
+                  <a:lumMod val="20000"/>
+                  <a:lumOff val="80000"/>
+                </a:schemeClr>
+              </a:solidFill>
+            </a:endParaRPr>
           </a:p>
           <a:p>
             <a:pPr lvl="2"/>
@@ -9357,8 +9367,27 @@
                   </a:schemeClr>
                 </a:solidFill>
               </a:rPr>
-              <a:t>hardly reused</a:t>
-            </a:r>
+              <a:t>hardly </a:t>
+            </a:r>
+            <a:r>
+              <a:rPr lang="en-US" dirty="0" smtClean="0">
+                <a:solidFill>
+                  <a:schemeClr val="accent5">
+                    <a:lumMod val="20000"/>
+                    <a:lumOff val="80000"/>
+                  </a:schemeClr>
+                </a:solidFill>
+              </a:rPr>
+              <a:t>to reuse</a:t>
+            </a:r>
+            <a:endParaRPr lang="en-US" dirty="0" smtClean="0">
+              <a:solidFill>
+                <a:schemeClr val="accent5">
+                  <a:lumMod val="20000"/>
+                  <a:lumOff val="80000"/>
+                </a:schemeClr>
+              </a:solidFill>
+            </a:endParaRPr>
           </a:p>
           <a:p>
             <a:r>
@@ -10497,7 +10526,15 @@
             </a:pPr>
             <a:r>
               <a:rPr lang="en-US" dirty="0" smtClean="0"/>
-              <a:t>Exceptions are the nice way to handle errors in a programming language</a:t>
+              <a:t>Exceptions are the </a:t>
+            </a:r>
+            <a:r>
+              <a:rPr lang="en-US" dirty="0" smtClean="0"/>
+              <a:t>correct way </a:t>
+            </a:r>
+            <a:r>
+              <a:rPr lang="en-US" dirty="0" smtClean="0"/>
+              <a:t>to handle errors in a programming language</a:t>
             </a:r>
           </a:p>
           <a:p>
@@ -11339,8 +11376,8 @@
         </p:nvSpPr>
         <p:spPr>
           <a:xfrm>
-            <a:off x="228600" y="836341"/>
-            <a:ext cx="8686800" cy="5791200"/>
+            <a:off x="228600" y="1366981"/>
+            <a:ext cx="8686800" cy="5260559"/>
           </a:xfrm>
         </p:spPr>
         <p:txBody>
@@ -11398,35 +11435,13 @@
             </a:pPr>
             <a:r>
               <a:rPr lang="en-US" dirty="0" smtClean="0"/>
-              <a:t>An exception message</a:t>
-            </a:r>
-          </a:p>
-          <a:p>
-            <a:pPr lvl="1">
-              <a:lnSpc>
-                <a:spcPct val="100000"/>
-              </a:lnSpc>
-            </a:pPr>
-            <a:r>
-              <a:rPr lang="en-US" dirty="0" smtClean="0"/>
-              <a:t>No exception stack trace in </a:t>
-            </a:r>
-            <a:r>
-              <a:rPr lang="en-US" dirty="0" smtClean="0"/>
-              <a:t>JavaScript standard</a:t>
+              <a:t>An exception </a:t>
+            </a:r>
+            <a:r>
+              <a:rPr lang="en-US" dirty="0" smtClean="0"/>
+              <a:t>message</a:t>
             </a:r>
             <a:endParaRPr lang="en-US" dirty="0" smtClean="0"/>
-          </a:p>
-          <a:p>
-            <a:pPr lvl="2">
-              <a:lnSpc>
-                <a:spcPct val="100000"/>
-              </a:lnSpc>
-            </a:pPr>
-            <a:r>
-              <a:rPr lang="en-US" dirty="0" smtClean="0"/>
-              <a:t>Some browsers implement it on their own</a:t>
-            </a:r>
           </a:p>
         </p:txBody>
       </p:sp>

</xml_diff>